<commit_message>
Generated report of data elimination via ggplot. Updated final report.
</commit_message>
<xml_diff>
--- a/FinalPresentation.pptx
+++ b/FinalPresentation.pptx
@@ -9,6 +9,8 @@
     <p:sldId id="257" r:id="rId3"/>
     <p:sldId id="258" r:id="rId4"/>
     <p:sldId id="259" r:id="rId5"/>
+    <p:sldId id="261" r:id="rId6"/>
+    <p:sldId id="260" r:id="rId7"/>
   </p:sldIdLst>
   <p:sldSz cx="12192000" cy="6858000"/>
   <p:notesSz cx="6858000" cy="9144000"/>
@@ -107,6 +109,11 @@
       </a:defRPr>
     </a:lvl9pPr>
   </p:defaultTextStyle>
+  <p:extLst>
+    <p:ext uri="{EFAFB233-063F-42B5-8137-9DF3F51BA10A}">
+      <p15:sldGuideLst xmlns:p15="http://schemas.microsoft.com/office/powerpoint/2012/main"/>
+    </p:ext>
+  </p:extLst>
 </p:presentation>
 </file>
 
@@ -257,7 +264,7 @@
           <a:p>
             <a:fld id="{BAD8DEC3-C081-0644-B0B4-ADA265899D0F}" type="datetimeFigureOut">
               <a:rPr lang="en-US" smtClean="0"/>
-              <a:t>11/5/18</a:t>
+              <a:t>11/12/18</a:t>
             </a:fld>
             <a:endParaRPr lang="en-US"/>
           </a:p>
@@ -455,7 +462,7 @@
           <a:p>
             <a:fld id="{BAD8DEC3-C081-0644-B0B4-ADA265899D0F}" type="datetimeFigureOut">
               <a:rPr lang="en-US" smtClean="0"/>
-              <a:t>11/5/18</a:t>
+              <a:t>11/12/18</a:t>
             </a:fld>
             <a:endParaRPr lang="en-US"/>
           </a:p>
@@ -663,7 +670,7 @@
           <a:p>
             <a:fld id="{BAD8DEC3-C081-0644-B0B4-ADA265899D0F}" type="datetimeFigureOut">
               <a:rPr lang="en-US" smtClean="0"/>
-              <a:t>11/5/18</a:t>
+              <a:t>11/12/18</a:t>
             </a:fld>
             <a:endParaRPr lang="en-US"/>
           </a:p>
@@ -861,7 +868,7 @@
           <a:p>
             <a:fld id="{BAD8DEC3-C081-0644-B0B4-ADA265899D0F}" type="datetimeFigureOut">
               <a:rPr lang="en-US" smtClean="0"/>
-              <a:t>11/5/18</a:t>
+              <a:t>11/12/18</a:t>
             </a:fld>
             <a:endParaRPr lang="en-US"/>
           </a:p>
@@ -1136,7 +1143,7 @@
           <a:p>
             <a:fld id="{BAD8DEC3-C081-0644-B0B4-ADA265899D0F}" type="datetimeFigureOut">
               <a:rPr lang="en-US" smtClean="0"/>
-              <a:t>11/5/18</a:t>
+              <a:t>11/12/18</a:t>
             </a:fld>
             <a:endParaRPr lang="en-US"/>
           </a:p>
@@ -1401,7 +1408,7 @@
           <a:p>
             <a:fld id="{BAD8DEC3-C081-0644-B0B4-ADA265899D0F}" type="datetimeFigureOut">
               <a:rPr lang="en-US" smtClean="0"/>
-              <a:t>11/5/18</a:t>
+              <a:t>11/12/18</a:t>
             </a:fld>
             <a:endParaRPr lang="en-US"/>
           </a:p>
@@ -1813,7 +1820,7 @@
           <a:p>
             <a:fld id="{BAD8DEC3-C081-0644-B0B4-ADA265899D0F}" type="datetimeFigureOut">
               <a:rPr lang="en-US" smtClean="0"/>
-              <a:t>11/5/18</a:t>
+              <a:t>11/12/18</a:t>
             </a:fld>
             <a:endParaRPr lang="en-US"/>
           </a:p>
@@ -1954,7 +1961,7 @@
           <a:p>
             <a:fld id="{BAD8DEC3-C081-0644-B0B4-ADA265899D0F}" type="datetimeFigureOut">
               <a:rPr lang="en-US" smtClean="0"/>
-              <a:t>11/5/18</a:t>
+              <a:t>11/12/18</a:t>
             </a:fld>
             <a:endParaRPr lang="en-US"/>
           </a:p>
@@ -2067,7 +2074,7 @@
           <a:p>
             <a:fld id="{BAD8DEC3-C081-0644-B0B4-ADA265899D0F}" type="datetimeFigureOut">
               <a:rPr lang="en-US" smtClean="0"/>
-              <a:t>11/5/18</a:t>
+              <a:t>11/12/18</a:t>
             </a:fld>
             <a:endParaRPr lang="en-US"/>
           </a:p>
@@ -2378,7 +2385,7 @@
           <a:p>
             <a:fld id="{BAD8DEC3-C081-0644-B0B4-ADA265899D0F}" type="datetimeFigureOut">
               <a:rPr lang="en-US" smtClean="0"/>
-              <a:t>11/5/18</a:t>
+              <a:t>11/12/18</a:t>
             </a:fld>
             <a:endParaRPr lang="en-US"/>
           </a:p>
@@ -2666,7 +2673,7 @@
           <a:p>
             <a:fld id="{BAD8DEC3-C081-0644-B0B4-ADA265899D0F}" type="datetimeFigureOut">
               <a:rPr lang="en-US" smtClean="0"/>
-              <a:t>11/5/18</a:t>
+              <a:t>11/12/18</a:t>
             </a:fld>
             <a:endParaRPr lang="en-US"/>
           </a:p>
@@ -2907,7 +2914,7 @@
           <a:p>
             <a:fld id="{BAD8DEC3-C081-0644-B0B4-ADA265899D0F}" type="datetimeFigureOut">
               <a:rPr lang="en-US" smtClean="0"/>
-              <a:t>11/5/18</a:t>
+              <a:t>11/12/18</a:t>
             </a:fld>
             <a:endParaRPr lang="en-US"/>
           </a:p>
@@ -3765,12 +3772,228 @@
               <a:t>Number of servings in the recipe</a:t>
             </a:r>
           </a:p>
+          <a:p>
+            <a:r>
+              <a:rPr lang="en-US" dirty="0"/>
+              <a:t>Volume of reviews</a:t>
+            </a:r>
+          </a:p>
         </p:txBody>
       </p:sp>
     </p:spTree>
     <p:extLst>
       <p:ext uri="{BB962C8B-B14F-4D97-AF65-F5344CB8AC3E}">
         <p14:creationId xmlns:p14="http://schemas.microsoft.com/office/powerpoint/2010/main" val="2165159971"/>
+      </p:ext>
+    </p:extLst>
+  </p:cSld>
+  <p:clrMapOvr>
+    <a:masterClrMapping/>
+  </p:clrMapOvr>
+</p:sld>
+</file>
+
+<file path=ppt/slides/slide5.xml><?xml version="1.0" encoding="utf-8"?>
+<p:sld xmlns:a="http://schemas.openxmlformats.org/drawingml/2006/main" xmlns:r="http://schemas.openxmlformats.org/officeDocument/2006/relationships" xmlns:p="http://schemas.openxmlformats.org/presentationml/2006/main">
+  <p:cSld>
+    <p:spTree>
+      <p:nvGrpSpPr>
+        <p:cNvPr id="1" name=""/>
+        <p:cNvGrpSpPr/>
+        <p:nvPr/>
+      </p:nvGrpSpPr>
+      <p:grpSpPr>
+        <a:xfrm>
+          <a:off x="0" y="0"/>
+          <a:ext cx="0" cy="0"/>
+          <a:chOff x="0" y="0"/>
+          <a:chExt cx="0" cy="0"/>
+        </a:xfrm>
+      </p:grpSpPr>
+      <p:sp>
+        <p:nvSpPr>
+          <p:cNvPr id="2" name="Title 1">
+            <a:extLst>
+              <a:ext uri="{FF2B5EF4-FFF2-40B4-BE49-F238E27FC236}">
+                <a16:creationId xmlns:a16="http://schemas.microsoft.com/office/drawing/2014/main" id="{5C288606-3FF3-C34A-9ACC-A04BD9EF2F5B}"/>
+              </a:ext>
+            </a:extLst>
+          </p:cNvPr>
+          <p:cNvSpPr>
+            <a:spLocks noGrp="1"/>
+          </p:cNvSpPr>
+          <p:nvPr>
+            <p:ph type="title"/>
+          </p:nvPr>
+        </p:nvSpPr>
+        <p:spPr/>
+        <p:txBody>
+          <a:bodyPr/>
+          <a:lstStyle/>
+          <a:p>
+            <a:r>
+              <a:rPr lang="en-US" dirty="0"/>
+              <a:t>Data Cleansing</a:t>
+            </a:r>
+          </a:p>
+        </p:txBody>
+      </p:sp>
+      <p:sp>
+        <p:nvSpPr>
+          <p:cNvPr id="3" name="Content Placeholder 2">
+            <a:extLst>
+              <a:ext uri="{FF2B5EF4-FFF2-40B4-BE49-F238E27FC236}">
+                <a16:creationId xmlns:a16="http://schemas.microsoft.com/office/drawing/2014/main" id="{3ED68AF7-2AA0-E444-BA9D-D744BA30FB49}"/>
+              </a:ext>
+            </a:extLst>
+          </p:cNvPr>
+          <p:cNvSpPr>
+            <a:spLocks noGrp="1"/>
+          </p:cNvSpPr>
+          <p:nvPr>
+            <p:ph idx="1"/>
+          </p:nvPr>
+        </p:nvSpPr>
+        <p:spPr/>
+        <p:txBody>
+          <a:bodyPr/>
+          <a:lstStyle/>
+          <a:p>
+            <a:r>
+              <a:rPr lang="en-US" dirty="0"/>
+              <a:t>Not all original recipe data was usable. Some records had…</a:t>
+            </a:r>
+          </a:p>
+          <a:p>
+            <a:pPr lvl="1"/>
+            <a:r>
+              <a:rPr lang="en-US" dirty="0"/>
+              <a:t>NA values instead of key numeric data</a:t>
+            </a:r>
+          </a:p>
+          <a:p>
+            <a:pPr lvl="1"/>
+            <a:r>
+              <a:rPr lang="en-US" dirty="0"/>
+              <a:t>Impossible numeric data values (e.g., 0 calories, 0 rating - all ratings are on a one “fork” to five “fork” scale)</a:t>
+            </a:r>
+          </a:p>
+        </p:txBody>
+      </p:sp>
+    </p:spTree>
+    <p:extLst>
+      <p:ext uri="{BB962C8B-B14F-4D97-AF65-F5344CB8AC3E}">
+        <p14:creationId xmlns:p14="http://schemas.microsoft.com/office/powerpoint/2010/main" val="3903959520"/>
+      </p:ext>
+    </p:extLst>
+  </p:cSld>
+  <p:clrMapOvr>
+    <a:masterClrMapping/>
+  </p:clrMapOvr>
+</p:sld>
+</file>
+
+<file path=ppt/slides/slide6.xml><?xml version="1.0" encoding="utf-8"?>
+<p:sld xmlns:a="http://schemas.openxmlformats.org/drawingml/2006/main" xmlns:r="http://schemas.openxmlformats.org/officeDocument/2006/relationships" xmlns:p="http://schemas.openxmlformats.org/presentationml/2006/main">
+  <p:cSld>
+    <p:bg>
+      <p:bgPr>
+        <a:solidFill>
+          <a:schemeClr val="bg1"/>
+        </a:solidFill>
+        <a:effectLst/>
+      </p:bgPr>
+    </p:bg>
+    <p:spTree>
+      <p:nvGrpSpPr>
+        <p:cNvPr id="1" name=""/>
+        <p:cNvGrpSpPr/>
+        <p:nvPr/>
+      </p:nvGrpSpPr>
+      <p:grpSpPr>
+        <a:xfrm>
+          <a:off x="0" y="0"/>
+          <a:ext cx="0" cy="0"/>
+          <a:chOff x="0" y="0"/>
+          <a:chExt cx="0" cy="0"/>
+        </a:xfrm>
+      </p:grpSpPr>
+      <p:sp>
+        <p:nvSpPr>
+          <p:cNvPr id="2" name="Title 1">
+            <a:extLst>
+              <a:ext uri="{FF2B5EF4-FFF2-40B4-BE49-F238E27FC236}">
+                <a16:creationId xmlns:a16="http://schemas.microsoft.com/office/drawing/2014/main" id="{F6DC17E0-4B50-EA45-8D63-AC1560CF5CF0}"/>
+              </a:ext>
+            </a:extLst>
+          </p:cNvPr>
+          <p:cNvSpPr>
+            <a:spLocks noGrp="1"/>
+          </p:cNvSpPr>
+          <p:nvPr>
+            <p:ph type="title"/>
+          </p:nvPr>
+        </p:nvSpPr>
+        <p:spPr>
+          <a:xfrm>
+            <a:off x="838200" y="365125"/>
+            <a:ext cx="10515600" cy="1325563"/>
+          </a:xfrm>
+        </p:spPr>
+        <p:txBody>
+          <a:bodyPr vert="horz" lIns="91440" tIns="45720" rIns="91440" bIns="45720" rtlCol="0" anchor="ctr">
+            <a:normAutofit/>
+          </a:bodyPr>
+          <a:lstStyle/>
+          <a:p>
+            <a:r>
+              <a:rPr lang="en-US" kern="1200" dirty="0">
+                <a:solidFill>
+                  <a:schemeClr val="tx1"/>
+                </a:solidFill>
+                <a:latin typeface="+mj-lt"/>
+                <a:ea typeface="+mj-ea"/>
+                <a:cs typeface="+mj-cs"/>
+              </a:rPr>
+              <a:t>Results of Data Cleansing</a:t>
+            </a:r>
+          </a:p>
+        </p:txBody>
+      </p:sp>
+      <p:pic>
+        <p:nvPicPr>
+          <p:cNvPr id="5" name="Picture 4">
+            <a:extLst>
+              <a:ext uri="{FF2B5EF4-FFF2-40B4-BE49-F238E27FC236}">
+                <a16:creationId xmlns:a16="http://schemas.microsoft.com/office/drawing/2014/main" id="{BDF50017-936D-E24A-8124-A494CEE7EC09}"/>
+              </a:ext>
+            </a:extLst>
+          </p:cNvPr>
+          <p:cNvPicPr>
+            <a:picLocks noChangeAspect="1"/>
+          </p:cNvPicPr>
+          <p:nvPr/>
+        </p:nvPicPr>
+        <p:blipFill>
+          <a:blip r:embed="rId2"/>
+          <a:stretch>
+            <a:fillRect/>
+          </a:stretch>
+        </p:blipFill>
+        <p:spPr>
+          <a:xfrm>
+            <a:off x="2273643" y="1555105"/>
+            <a:ext cx="7644714" cy="4909330"/>
+          </a:xfrm>
+          <a:prstGeom prst="rect">
+            <a:avLst/>
+          </a:prstGeom>
+        </p:spPr>
+      </p:pic>
+    </p:spTree>
+    <p:extLst>
+      <p:ext uri="{BB962C8B-B14F-4D97-AF65-F5344CB8AC3E}">
+        <p14:creationId xmlns:p14="http://schemas.microsoft.com/office/powerpoint/2010/main" val="3372724736"/>
       </p:ext>
     </p:extLst>
   </p:cSld>

</xml_diff>